<commit_message>
New plotting for Z matrix simulation data
</commit_message>
<xml_diff>
--- a/Tables_Figures/Figure_Distribs/Figure_Distribs.pptx
+++ b/Tables_Figures/Figure_Distribs/Figure_Distribs.pptx
@@ -6,6 +6,8 @@
   </p:sldMasterIdLst>
   <p:sldIdLst>
     <p:sldId id="256" r:id="rId2"/>
+    <p:sldId id="260" r:id="rId3"/>
+    <p:sldId id="257" r:id="rId4"/>
   </p:sldIdLst>
   <p:sldSz cx="9144000" cy="6858000" type="screen4x3"/>
   <p:notesSz cx="6858000" cy="9144000"/>
@@ -288,7 +290,7 @@
           <a:p>
             <a:fld id="{DF85ABBD-4D3D-4146-AA99-725D0778CF38}" type="datetimeFigureOut">
               <a:rPr lang="en-US" smtClean="0"/>
-              <a:t>2/21/14</a:t>
+              <a:t>4/23/14</a:t>
             </a:fld>
             <a:endParaRPr lang="en-US"/>
           </a:p>
@@ -458,7 +460,7 @@
           <a:p>
             <a:fld id="{DF85ABBD-4D3D-4146-AA99-725D0778CF38}" type="datetimeFigureOut">
               <a:rPr lang="en-US" smtClean="0"/>
-              <a:t>2/21/14</a:t>
+              <a:t>4/23/14</a:t>
             </a:fld>
             <a:endParaRPr lang="en-US"/>
           </a:p>
@@ -638,7 +640,7 @@
           <a:p>
             <a:fld id="{DF85ABBD-4D3D-4146-AA99-725D0778CF38}" type="datetimeFigureOut">
               <a:rPr lang="en-US" smtClean="0"/>
-              <a:t>2/21/14</a:t>
+              <a:t>4/23/14</a:t>
             </a:fld>
             <a:endParaRPr lang="en-US"/>
           </a:p>
@@ -808,7 +810,7 @@
           <a:p>
             <a:fld id="{DF85ABBD-4D3D-4146-AA99-725D0778CF38}" type="datetimeFigureOut">
               <a:rPr lang="en-US" smtClean="0"/>
-              <a:t>2/21/14</a:t>
+              <a:t>4/23/14</a:t>
             </a:fld>
             <a:endParaRPr lang="en-US"/>
           </a:p>
@@ -1054,7 +1056,7 @@
           <a:p>
             <a:fld id="{DF85ABBD-4D3D-4146-AA99-725D0778CF38}" type="datetimeFigureOut">
               <a:rPr lang="en-US" smtClean="0"/>
-              <a:t>2/21/14</a:t>
+              <a:t>4/23/14</a:t>
             </a:fld>
             <a:endParaRPr lang="en-US"/>
           </a:p>
@@ -1342,7 +1344,7 @@
           <a:p>
             <a:fld id="{DF85ABBD-4D3D-4146-AA99-725D0778CF38}" type="datetimeFigureOut">
               <a:rPr lang="en-US" smtClean="0"/>
-              <a:t>2/21/14</a:t>
+              <a:t>4/23/14</a:t>
             </a:fld>
             <a:endParaRPr lang="en-US"/>
           </a:p>
@@ -1764,7 +1766,7 @@
           <a:p>
             <a:fld id="{DF85ABBD-4D3D-4146-AA99-725D0778CF38}" type="datetimeFigureOut">
               <a:rPr lang="en-US" smtClean="0"/>
-              <a:t>2/21/14</a:t>
+              <a:t>4/23/14</a:t>
             </a:fld>
             <a:endParaRPr lang="en-US"/>
           </a:p>
@@ -1882,7 +1884,7 @@
           <a:p>
             <a:fld id="{DF85ABBD-4D3D-4146-AA99-725D0778CF38}" type="datetimeFigureOut">
               <a:rPr lang="en-US" smtClean="0"/>
-              <a:t>2/21/14</a:t>
+              <a:t>4/23/14</a:t>
             </a:fld>
             <a:endParaRPr lang="en-US"/>
           </a:p>
@@ -1977,7 +1979,7 @@
           <a:p>
             <a:fld id="{DF85ABBD-4D3D-4146-AA99-725D0778CF38}" type="datetimeFigureOut">
               <a:rPr lang="en-US" smtClean="0"/>
-              <a:t>2/21/14</a:t>
+              <a:t>4/23/14</a:t>
             </a:fld>
             <a:endParaRPr lang="en-US"/>
           </a:p>
@@ -2254,7 +2256,7 @@
           <a:p>
             <a:fld id="{DF85ABBD-4D3D-4146-AA99-725D0778CF38}" type="datetimeFigureOut">
               <a:rPr lang="en-US" smtClean="0"/>
-              <a:t>2/21/14</a:t>
+              <a:t>4/23/14</a:t>
             </a:fld>
             <a:endParaRPr lang="en-US"/>
           </a:p>
@@ -2507,7 +2509,7 @@
           <a:p>
             <a:fld id="{DF85ABBD-4D3D-4146-AA99-725D0778CF38}" type="datetimeFigureOut">
               <a:rPr lang="en-US" smtClean="0"/>
-              <a:t>2/21/14</a:t>
+              <a:t>4/23/14</a:t>
             </a:fld>
             <a:endParaRPr lang="en-US"/>
           </a:p>
@@ -2720,7 +2722,7 @@
           <a:p>
             <a:fld id="{DF85ABBD-4D3D-4146-AA99-725D0778CF38}" type="datetimeFigureOut">
               <a:rPr lang="en-US" smtClean="0"/>
-              <a:t>2/21/14</a:t>
+              <a:t>4/23/14</a:t>
             </a:fld>
             <a:endParaRPr lang="en-US"/>
           </a:p>
@@ -3095,6 +3097,661 @@
           <a:chExt cx="0" cy="0"/>
         </a:xfrm>
       </p:grpSpPr>
+      <p:sp>
+        <p:nvSpPr>
+          <p:cNvPr id="2" name="TextBox 1"/>
+          <p:cNvSpPr txBox="1"/>
+          <p:nvPr/>
+        </p:nvSpPr>
+        <p:spPr>
+          <a:xfrm>
+            <a:off x="389644" y="216454"/>
+            <a:ext cx="1172116" cy="369332"/>
+          </a:xfrm>
+          <a:prstGeom prst="rect">
+            <a:avLst/>
+          </a:prstGeom>
+          <a:noFill/>
+        </p:spPr>
+        <p:txBody>
+          <a:bodyPr wrap="none" rtlCol="0">
+            <a:spAutoFit/>
+          </a:bodyPr>
+          <a:lstStyle/>
+          <a:p>
+            <a:r>
+              <a:rPr lang="en-US" dirty="0"/>
+              <a:t>Z</a:t>
+            </a:r>
+            <a:r>
+              <a:rPr lang="en-US" dirty="0" smtClean="0"/>
+              <a:t>-matrices</a:t>
+            </a:r>
+            <a:endParaRPr lang="en-US" dirty="0"/>
+          </a:p>
+        </p:txBody>
+      </p:sp>
+      <p:grpSp>
+        <p:nvGrpSpPr>
+          <p:cNvPr id="3" name="Group 2"/>
+          <p:cNvGrpSpPr/>
+          <p:nvPr/>
+        </p:nvGrpSpPr>
+        <p:grpSpPr>
+          <a:xfrm>
+            <a:off x="721562" y="678224"/>
+            <a:ext cx="8009344" cy="5584526"/>
+            <a:chOff x="721562" y="678224"/>
+            <a:chExt cx="8009344" cy="5584526"/>
+          </a:xfrm>
+        </p:grpSpPr>
+        <p:sp>
+          <p:nvSpPr>
+            <p:cNvPr id="10" name="Rectangle 9"/>
+            <p:cNvSpPr/>
+            <p:nvPr/>
+          </p:nvSpPr>
+          <p:spPr>
+            <a:xfrm>
+              <a:off x="721562" y="678224"/>
+              <a:ext cx="8009344" cy="5584526"/>
+            </a:xfrm>
+            <a:prstGeom prst="rect">
+              <a:avLst/>
+            </a:prstGeom>
+            <a:solidFill>
+              <a:schemeClr val="bg1"/>
+            </a:solidFill>
+            <a:ln>
+              <a:noFill/>
+            </a:ln>
+            <a:effectLst/>
+          </p:spPr>
+          <p:style>
+            <a:lnRef idx="1">
+              <a:schemeClr val="accent1"/>
+            </a:lnRef>
+            <a:fillRef idx="3">
+              <a:schemeClr val="accent1"/>
+            </a:fillRef>
+            <a:effectRef idx="2">
+              <a:schemeClr val="accent1"/>
+            </a:effectRef>
+            <a:fontRef idx="minor">
+              <a:schemeClr val="lt1"/>
+            </a:fontRef>
+          </p:style>
+          <p:txBody>
+            <a:bodyPr rtlCol="0" anchor="ctr"/>
+            <a:lstStyle/>
+            <a:p>
+              <a:pPr algn="ctr"/>
+              <a:endParaRPr lang="en-US"/>
+            </a:p>
+          </p:txBody>
+        </p:sp>
+        <p:pic>
+          <p:nvPicPr>
+            <p:cNvPr id="5" name="Picture 4" descr="Distrib_Sim.pdf"/>
+            <p:cNvPicPr>
+              <a:picLocks noChangeAspect="1"/>
+            </p:cNvPicPr>
+            <p:nvPr/>
+          </p:nvPicPr>
+          <p:blipFill rotWithShape="1">
+            <a:blip r:embed="rId2">
+              <a:extLst>
+                <a:ext uri="{28A0092B-C50C-407E-A947-70E740481C1C}">
+                  <a14:useLocalDpi xmlns:a14="http://schemas.microsoft.com/office/drawing/2010/main" val="0"/>
+                </a:ext>
+              </a:extLst>
+            </a:blip>
+            <a:srcRect l="74272" t="23923" r="3668" b="27341"/>
+            <a:stretch/>
+          </p:blipFill>
+          <p:spPr>
+            <a:xfrm>
+              <a:off x="6869278" y="895422"/>
+              <a:ext cx="1529713" cy="2401532"/>
+            </a:xfrm>
+            <a:prstGeom prst="rect">
+              <a:avLst/>
+            </a:prstGeom>
+          </p:spPr>
+        </p:pic>
+        <p:sp>
+          <p:nvSpPr>
+            <p:cNvPr id="6" name="TextBox 5"/>
+            <p:cNvSpPr txBox="1"/>
+            <p:nvPr/>
+          </p:nvSpPr>
+          <p:spPr>
+            <a:xfrm>
+              <a:off x="1650009" y="5618627"/>
+              <a:ext cx="4356669" cy="369332"/>
+            </a:xfrm>
+            <a:prstGeom prst="rect">
+              <a:avLst/>
+            </a:prstGeom>
+            <a:noFill/>
+          </p:spPr>
+          <p:txBody>
+            <a:bodyPr wrap="none" rtlCol="0">
+              <a:spAutoFit/>
+            </a:bodyPr>
+            <a:lstStyle/>
+            <a:p>
+              <a:r>
+                <a:rPr lang="en-US" dirty="0" smtClean="0">
+                  <a:latin typeface="Microsoft Sans Serif"/>
+                  <a:cs typeface="Microsoft Sans Serif"/>
+                </a:rPr>
+                <a:t>Site-specific Covariate Value Distribution</a:t>
+              </a:r>
+              <a:endParaRPr lang="en-US" dirty="0">
+                <a:latin typeface="Microsoft Sans Serif"/>
+                <a:cs typeface="Microsoft Sans Serif"/>
+              </a:endParaRPr>
+            </a:p>
+          </p:txBody>
+        </p:sp>
+        <p:sp>
+          <p:nvSpPr>
+            <p:cNvPr id="7" name="TextBox 6"/>
+            <p:cNvSpPr txBox="1"/>
+            <p:nvPr/>
+          </p:nvSpPr>
+          <p:spPr>
+            <a:xfrm rot="16200000">
+              <a:off x="635368" y="3100030"/>
+              <a:ext cx="800632" cy="369332"/>
+            </a:xfrm>
+            <a:prstGeom prst="rect">
+              <a:avLst/>
+            </a:prstGeom>
+            <a:noFill/>
+          </p:spPr>
+          <p:txBody>
+            <a:bodyPr wrap="none" rtlCol="0">
+              <a:spAutoFit/>
+            </a:bodyPr>
+            <a:lstStyle/>
+            <a:p>
+              <a:r>
+                <a:rPr lang="en-US" dirty="0" smtClean="0">
+                  <a:latin typeface="Microsoft Sans Serif"/>
+                  <a:cs typeface="Microsoft Sans Serif"/>
+                </a:rPr>
+                <a:t>Count</a:t>
+              </a:r>
+              <a:endParaRPr lang="en-US" dirty="0">
+                <a:latin typeface="Microsoft Sans Serif"/>
+                <a:cs typeface="Microsoft Sans Serif"/>
+              </a:endParaRPr>
+            </a:p>
+          </p:txBody>
+        </p:sp>
+        <p:sp>
+          <p:nvSpPr>
+            <p:cNvPr id="8" name="TextBox 7"/>
+            <p:cNvSpPr txBox="1"/>
+            <p:nvPr/>
+          </p:nvSpPr>
+          <p:spPr>
+            <a:xfrm rot="5400000">
+              <a:off x="4231729" y="3100030"/>
+              <a:ext cx="4778547" cy="369332"/>
+            </a:xfrm>
+            <a:prstGeom prst="rect">
+              <a:avLst/>
+            </a:prstGeom>
+            <a:noFill/>
+          </p:spPr>
+          <p:txBody>
+            <a:bodyPr wrap="none" rtlCol="0">
+              <a:spAutoFit/>
+            </a:bodyPr>
+            <a:lstStyle/>
+            <a:p>
+              <a:r>
+                <a:rPr lang="en-US" dirty="0" smtClean="0">
+                  <a:latin typeface="Microsoft Sans Serif"/>
+                  <a:cs typeface="Microsoft Sans Serif"/>
+                </a:rPr>
+                <a:t>Species-specific Covariate Effect Distribution</a:t>
+              </a:r>
+              <a:endParaRPr lang="en-US" dirty="0">
+                <a:latin typeface="Microsoft Sans Serif"/>
+                <a:cs typeface="Microsoft Sans Serif"/>
+              </a:endParaRPr>
+            </a:p>
+          </p:txBody>
+        </p:sp>
+        <p:pic>
+          <p:nvPicPr>
+            <p:cNvPr id="12" name="Picture 11" descr="Figure_Distribs_Z.pdf"/>
+            <p:cNvPicPr>
+              <a:picLocks noChangeAspect="1"/>
+            </p:cNvPicPr>
+            <p:nvPr/>
+          </p:nvPicPr>
+          <p:blipFill rotWithShape="1">
+            <a:blip r:embed="rId3">
+              <a:extLst>
+                <a:ext uri="{28A0092B-C50C-407E-A947-70E740481C1C}">
+                  <a14:useLocalDpi xmlns:a14="http://schemas.microsoft.com/office/drawing/2010/main" val="0"/>
+                </a:ext>
+              </a:extLst>
+            </a:blip>
+            <a:srcRect r="22177"/>
+            <a:stretch/>
+          </p:blipFill>
+          <p:spPr>
+            <a:xfrm>
+              <a:off x="1220351" y="1010098"/>
+              <a:ext cx="5215986" cy="4549196"/>
+            </a:xfrm>
+            <a:prstGeom prst="rect">
+              <a:avLst/>
+            </a:prstGeom>
+          </p:spPr>
+        </p:pic>
+      </p:grpSp>
+    </p:spTree>
+    <p:extLst>
+      <p:ext uri="{BB962C8B-B14F-4D97-AF65-F5344CB8AC3E}">
+        <p14:creationId xmlns:p14="http://schemas.microsoft.com/office/powerpoint/2010/main" val="1752427900"/>
+      </p:ext>
+    </p:extLst>
+  </p:cSld>
+  <p:clrMapOvr>
+    <a:masterClrMapping/>
+  </p:clrMapOvr>
+</p:sld>
+</file>
+
+<file path=ppt/slides/slide2.xml><?xml version="1.0" encoding="utf-8"?>
+<p:sld xmlns:a="http://schemas.openxmlformats.org/drawingml/2006/main" xmlns:r="http://schemas.openxmlformats.org/officeDocument/2006/relationships" xmlns:p="http://schemas.openxmlformats.org/presentationml/2006/main">
+  <p:cSld>
+    <p:spTree>
+      <p:nvGrpSpPr>
+        <p:cNvPr id="1" name=""/>
+        <p:cNvGrpSpPr/>
+        <p:nvPr/>
+      </p:nvGrpSpPr>
+      <p:grpSpPr>
+        <a:xfrm>
+          <a:off x="0" y="0"/>
+          <a:ext cx="0" cy="0"/>
+          <a:chOff x="0" y="0"/>
+          <a:chExt cx="0" cy="0"/>
+        </a:xfrm>
+      </p:grpSpPr>
+      <p:sp>
+        <p:nvSpPr>
+          <p:cNvPr id="2" name="TextBox 1"/>
+          <p:cNvSpPr txBox="1"/>
+          <p:nvPr/>
+        </p:nvSpPr>
+        <p:spPr>
+          <a:xfrm>
+            <a:off x="389644" y="216454"/>
+            <a:ext cx="1172116" cy="369332"/>
+          </a:xfrm>
+          <a:prstGeom prst="rect">
+            <a:avLst/>
+          </a:prstGeom>
+          <a:noFill/>
+        </p:spPr>
+        <p:txBody>
+          <a:bodyPr wrap="none" rtlCol="0">
+            <a:spAutoFit/>
+          </a:bodyPr>
+          <a:lstStyle/>
+          <a:p>
+            <a:r>
+              <a:rPr lang="en-US" dirty="0"/>
+              <a:t>Z</a:t>
+            </a:r>
+            <a:r>
+              <a:rPr lang="en-US" dirty="0" smtClean="0"/>
+              <a:t>-matrices</a:t>
+            </a:r>
+            <a:endParaRPr lang="en-US" dirty="0"/>
+          </a:p>
+        </p:txBody>
+      </p:sp>
+      <p:grpSp>
+        <p:nvGrpSpPr>
+          <p:cNvPr id="4" name="Group 3"/>
+          <p:cNvGrpSpPr/>
+          <p:nvPr/>
+        </p:nvGrpSpPr>
+        <p:grpSpPr>
+          <a:xfrm>
+            <a:off x="1561760" y="678224"/>
+            <a:ext cx="6072374" cy="5584526"/>
+            <a:chOff x="1561760" y="678224"/>
+            <a:chExt cx="6072374" cy="5584526"/>
+          </a:xfrm>
+        </p:grpSpPr>
+        <p:sp>
+          <p:nvSpPr>
+            <p:cNvPr id="10" name="Rectangle 9"/>
+            <p:cNvSpPr/>
+            <p:nvPr/>
+          </p:nvSpPr>
+          <p:spPr>
+            <a:xfrm>
+              <a:off x="1561760" y="678224"/>
+              <a:ext cx="6072374" cy="5584526"/>
+            </a:xfrm>
+            <a:prstGeom prst="rect">
+              <a:avLst/>
+            </a:prstGeom>
+            <a:solidFill>
+              <a:schemeClr val="bg1"/>
+            </a:solidFill>
+            <a:ln>
+              <a:noFill/>
+            </a:ln>
+            <a:effectLst/>
+          </p:spPr>
+          <p:style>
+            <a:lnRef idx="1">
+              <a:schemeClr val="accent1"/>
+            </a:lnRef>
+            <a:fillRef idx="3">
+              <a:schemeClr val="accent1"/>
+            </a:fillRef>
+            <a:effectRef idx="2">
+              <a:schemeClr val="accent1"/>
+            </a:effectRef>
+            <a:fontRef idx="minor">
+              <a:schemeClr val="lt1"/>
+            </a:fontRef>
+          </p:style>
+          <p:txBody>
+            <a:bodyPr rtlCol="0" anchor="ctr"/>
+            <a:lstStyle/>
+            <a:p>
+              <a:pPr algn="ctr"/>
+              <a:endParaRPr lang="en-US"/>
+            </a:p>
+          </p:txBody>
+        </p:sp>
+        <p:pic>
+          <p:nvPicPr>
+            <p:cNvPr id="5" name="Picture 4" descr="Distrib_Sim.pdf"/>
+            <p:cNvPicPr>
+              <a:picLocks noChangeAspect="1"/>
+            </p:cNvPicPr>
+            <p:nvPr/>
+          </p:nvPicPr>
+          <p:blipFill rotWithShape="1">
+            <a:blip r:embed="rId2">
+              <a:extLst>
+                <a:ext uri="{28A0092B-C50C-407E-A947-70E740481C1C}">
+                  <a14:useLocalDpi xmlns:a14="http://schemas.microsoft.com/office/drawing/2010/main" val="0"/>
+                </a:ext>
+              </a:extLst>
+            </a:blip>
+            <a:srcRect l="74272" t="23923" r="3668" b="27341"/>
+            <a:stretch/>
+          </p:blipFill>
+          <p:spPr>
+            <a:xfrm>
+              <a:off x="6104421" y="1268211"/>
+              <a:ext cx="1529713" cy="2401532"/>
+            </a:xfrm>
+            <a:prstGeom prst="rect">
+              <a:avLst/>
+            </a:prstGeom>
+          </p:spPr>
+        </p:pic>
+        <p:sp>
+          <p:nvSpPr>
+            <p:cNvPr id="6" name="TextBox 5"/>
+            <p:cNvSpPr txBox="1"/>
+            <p:nvPr/>
+          </p:nvSpPr>
+          <p:spPr>
+            <a:xfrm>
+              <a:off x="1693302" y="5821268"/>
+              <a:ext cx="4356669" cy="369332"/>
+            </a:xfrm>
+            <a:prstGeom prst="rect">
+              <a:avLst/>
+            </a:prstGeom>
+            <a:noFill/>
+          </p:spPr>
+          <p:txBody>
+            <a:bodyPr wrap="none" rtlCol="0">
+              <a:spAutoFit/>
+            </a:bodyPr>
+            <a:lstStyle/>
+            <a:p>
+              <a:r>
+                <a:rPr lang="en-US" dirty="0" smtClean="0">
+                  <a:latin typeface="Microsoft Sans Serif"/>
+                  <a:cs typeface="Microsoft Sans Serif"/>
+                </a:rPr>
+                <a:t>Site-specific Covariate Value Distribution</a:t>
+              </a:r>
+              <a:endParaRPr lang="en-US" dirty="0">
+                <a:latin typeface="Microsoft Sans Serif"/>
+                <a:cs typeface="Microsoft Sans Serif"/>
+              </a:endParaRPr>
+            </a:p>
+          </p:txBody>
+        </p:sp>
+        <p:sp>
+          <p:nvSpPr>
+            <p:cNvPr id="7" name="TextBox 6"/>
+            <p:cNvSpPr txBox="1"/>
+            <p:nvPr/>
+          </p:nvSpPr>
+          <p:spPr>
+            <a:xfrm rot="16200000">
+              <a:off x="1616693" y="3084760"/>
+              <a:ext cx="800632" cy="369332"/>
+            </a:xfrm>
+            <a:prstGeom prst="rect">
+              <a:avLst/>
+            </a:prstGeom>
+            <a:noFill/>
+          </p:spPr>
+          <p:txBody>
+            <a:bodyPr wrap="none" rtlCol="0">
+              <a:spAutoFit/>
+            </a:bodyPr>
+            <a:lstStyle/>
+            <a:p>
+              <a:r>
+                <a:rPr lang="en-US" dirty="0" smtClean="0">
+                  <a:latin typeface="Microsoft Sans Serif"/>
+                  <a:cs typeface="Microsoft Sans Serif"/>
+                </a:rPr>
+                <a:t>Count</a:t>
+              </a:r>
+              <a:endParaRPr lang="en-US" dirty="0">
+                <a:latin typeface="Microsoft Sans Serif"/>
+                <a:cs typeface="Microsoft Sans Serif"/>
+              </a:endParaRPr>
+            </a:p>
+          </p:txBody>
+        </p:sp>
+        <p:sp>
+          <p:nvSpPr>
+            <p:cNvPr id="8" name="TextBox 7"/>
+            <p:cNvSpPr txBox="1"/>
+            <p:nvPr/>
+          </p:nvSpPr>
+          <p:spPr>
+            <a:xfrm rot="5400000">
+              <a:off x="3360583" y="3084760"/>
+              <a:ext cx="4778547" cy="369332"/>
+            </a:xfrm>
+            <a:prstGeom prst="rect">
+              <a:avLst/>
+            </a:prstGeom>
+            <a:noFill/>
+          </p:spPr>
+          <p:txBody>
+            <a:bodyPr wrap="none" rtlCol="0">
+              <a:spAutoFit/>
+            </a:bodyPr>
+            <a:lstStyle/>
+            <a:p>
+              <a:r>
+                <a:rPr lang="en-US" dirty="0" smtClean="0">
+                  <a:latin typeface="Microsoft Sans Serif"/>
+                  <a:cs typeface="Microsoft Sans Serif"/>
+                </a:rPr>
+                <a:t>Species-specific Covariate Effect Distribution</a:t>
+              </a:r>
+              <a:endParaRPr lang="en-US" dirty="0">
+                <a:latin typeface="Microsoft Sans Serif"/>
+                <a:cs typeface="Microsoft Sans Serif"/>
+              </a:endParaRPr>
+            </a:p>
+          </p:txBody>
+        </p:sp>
+        <p:grpSp>
+          <p:nvGrpSpPr>
+            <p:cNvPr id="11" name="Group 10"/>
+            <p:cNvGrpSpPr>
+              <a:grpSpLocks noChangeAspect="1"/>
+            </p:cNvGrpSpPr>
+            <p:nvPr/>
+          </p:nvGrpSpPr>
+          <p:grpSpPr>
+            <a:xfrm>
+              <a:off x="2343698" y="915900"/>
+              <a:ext cx="2969290" cy="4707053"/>
+              <a:chOff x="711201" y="812800"/>
+              <a:chExt cx="3300688" cy="5232400"/>
+            </a:xfrm>
+          </p:grpSpPr>
+          <p:pic>
+            <p:nvPicPr>
+              <p:cNvPr id="13" name="Picture 12" descr="Figure_Distribs_Z.pdf"/>
+              <p:cNvPicPr>
+                <a:picLocks noChangeAspect="1"/>
+              </p:cNvPicPr>
+              <p:nvPr/>
+            </p:nvPicPr>
+            <p:blipFill rotWithShape="1">
+              <a:blip r:embed="rId3">
+                <a:extLst>
+                  <a:ext uri="{28A0092B-C50C-407E-A947-70E740481C1C}">
+                    <a14:useLocalDpi xmlns:a14="http://schemas.microsoft.com/office/drawing/2010/main" val="0"/>
+                  </a:ext>
+                </a:extLst>
+              </a:blip>
+              <a:srcRect r="95372"/>
+              <a:stretch/>
+            </p:blipFill>
+            <p:spPr>
+              <a:xfrm>
+                <a:off x="711201" y="812800"/>
+                <a:ext cx="356712" cy="5232400"/>
+              </a:xfrm>
+              <a:prstGeom prst="rect">
+                <a:avLst/>
+              </a:prstGeom>
+            </p:spPr>
+          </p:pic>
+          <p:pic>
+            <p:nvPicPr>
+              <p:cNvPr id="14" name="Picture 13" descr="Figure_Distribs_Z.pdf"/>
+              <p:cNvPicPr>
+                <a:picLocks noChangeAspect="1"/>
+              </p:cNvPicPr>
+              <p:nvPr/>
+            </p:nvPicPr>
+            <p:blipFill rotWithShape="1">
+              <a:blip r:embed="rId4">
+                <a:extLst>
+                  <a:ext uri="{28A0092B-C50C-407E-A947-70E740481C1C}">
+                    <a14:useLocalDpi xmlns:a14="http://schemas.microsoft.com/office/drawing/2010/main" val="0"/>
+                  </a:ext>
+                </a:extLst>
+              </a:blip>
+              <a:srcRect l="21288" r="61115"/>
+              <a:stretch/>
+            </p:blipFill>
+            <p:spPr>
+              <a:xfrm>
+                <a:off x="1039051" y="812800"/>
+                <a:ext cx="1356537" cy="5232400"/>
+              </a:xfrm>
+              <a:prstGeom prst="rect">
+                <a:avLst/>
+              </a:prstGeom>
+            </p:spPr>
+          </p:pic>
+          <p:pic>
+            <p:nvPicPr>
+              <p:cNvPr id="15" name="Picture 14" descr="Figure_Distribs_Z.pdf"/>
+              <p:cNvPicPr>
+                <a:picLocks noChangeAspect="1"/>
+              </p:cNvPicPr>
+              <p:nvPr/>
+            </p:nvPicPr>
+            <p:blipFill rotWithShape="1">
+              <a:blip r:embed="rId5">
+                <a:extLst>
+                  <a:ext uri="{28A0092B-C50C-407E-A947-70E740481C1C}">
+                    <a14:useLocalDpi xmlns:a14="http://schemas.microsoft.com/office/drawing/2010/main" val="0"/>
+                  </a:ext>
+                </a:extLst>
+              </a:blip>
+              <a:srcRect l="55734" r="22924"/>
+              <a:stretch/>
+            </p:blipFill>
+            <p:spPr>
+              <a:xfrm>
+                <a:off x="2366726" y="812800"/>
+                <a:ext cx="1645163" cy="5232400"/>
+              </a:xfrm>
+              <a:prstGeom prst="rect">
+                <a:avLst/>
+              </a:prstGeom>
+            </p:spPr>
+          </p:pic>
+        </p:grpSp>
+      </p:grpSp>
+    </p:spTree>
+    <p:extLst>
+      <p:ext uri="{BB962C8B-B14F-4D97-AF65-F5344CB8AC3E}">
+        <p14:creationId xmlns:p14="http://schemas.microsoft.com/office/powerpoint/2010/main" val="4163502499"/>
+      </p:ext>
+    </p:extLst>
+  </p:cSld>
+  <p:clrMapOvr>
+    <a:masterClrMapping/>
+  </p:clrMapOvr>
+</p:sld>
+</file>
+
+<file path=ppt/slides/slide3.xml><?xml version="1.0" encoding="utf-8"?>
+<p:sld xmlns:a="http://schemas.openxmlformats.org/drawingml/2006/main" xmlns:r="http://schemas.openxmlformats.org/officeDocument/2006/relationships" xmlns:p="http://schemas.openxmlformats.org/presentationml/2006/main">
+  <p:cSld>
+    <p:spTree>
+      <p:nvGrpSpPr>
+        <p:cNvPr id="1" name=""/>
+        <p:cNvGrpSpPr/>
+        <p:nvPr/>
+      </p:nvGrpSpPr>
+      <p:grpSpPr>
+        <a:xfrm>
+          <a:off x="0" y="0"/>
+          <a:ext cx="0" cy="0"/>
+          <a:chOff x="0" y="0"/>
+          <a:chExt cx="0" cy="0"/>
+        </a:xfrm>
+      </p:grpSpPr>
       <p:grpSp>
         <p:nvGrpSpPr>
           <p:cNvPr id="11" name="Group 10"/>
@@ -3336,10 +3993,44 @@
           </p:sp>
         </p:grpSp>
       </p:grpSp>
+      <p:sp>
+        <p:nvSpPr>
+          <p:cNvPr id="2" name="TextBox 1"/>
+          <p:cNvSpPr txBox="1"/>
+          <p:nvPr/>
+        </p:nvSpPr>
+        <p:spPr>
+          <a:xfrm>
+            <a:off x="288625" y="187594"/>
+            <a:ext cx="1176299" cy="369332"/>
+          </a:xfrm>
+          <a:prstGeom prst="rect">
+            <a:avLst/>
+          </a:prstGeom>
+          <a:noFill/>
+        </p:spPr>
+        <p:txBody>
+          <a:bodyPr wrap="none" rtlCol="0">
+            <a:spAutoFit/>
+          </a:bodyPr>
+          <a:lstStyle/>
+          <a:p>
+            <a:r>
+              <a:rPr lang="en-US" dirty="0"/>
+              <a:t>Y</a:t>
+            </a:r>
+            <a:r>
+              <a:rPr lang="en-US" dirty="0" smtClean="0"/>
+              <a:t>-matrices</a:t>
+            </a:r>
+            <a:endParaRPr lang="en-US" dirty="0"/>
+          </a:p>
+        </p:txBody>
+      </p:sp>
     </p:spTree>
     <p:extLst>
       <p:ext uri="{BB962C8B-B14F-4D97-AF65-F5344CB8AC3E}">
-        <p14:creationId xmlns:p14="http://schemas.microsoft.com/office/powerpoint/2010/main" val="1752427900"/>
+        <p14:creationId xmlns:p14="http://schemas.microsoft.com/office/powerpoint/2010/main" val="2051260943"/>
       </p:ext>
     </p:extLst>
   </p:cSld>

</xml_diff>